<commit_message>
polishing slides for deepsec
</commit_message>
<xml_diff>
--- a/presentations/20131122-Deepsec-ACH project.pptx
+++ b/presentations/20131122-Deepsec-ACH project.pptx
@@ -8409,7 +8409,7 @@
         <p:spPr/>
         <p:txBody>
           <a:bodyPr>
-            <a:normAutofit/>
+            <a:normAutofit fontScale="92500"/>
           </a:bodyPr>
           <a:lstStyle/>
           <a:p>
@@ -8429,6 +8429,67 @@
               <a:t>optimisation</a:t>
             </a:r>
             <a:endParaRPr lang="de-DE" dirty="0" smtClean="0"/>
+          </a:p>
+          <a:p>
+            <a:endParaRPr lang="de-DE" dirty="0"/>
+          </a:p>
+          <a:p>
+            <a:endParaRPr lang="de-DE" dirty="0" smtClean="0"/>
+          </a:p>
+          <a:p>
+            <a:endParaRPr lang="de-DE" dirty="0"/>
+          </a:p>
+          <a:p>
+            <a:endParaRPr lang="de-DE" dirty="0" smtClean="0"/>
+          </a:p>
+          <a:p>
+            <a:endParaRPr lang="de-DE" dirty="0"/>
+          </a:p>
+          <a:p>
+            <a:r>
+              <a:rPr lang="de-DE" dirty="0" smtClean="0"/>
+              <a:t>Potential </a:t>
+            </a:r>
+            <a:r>
+              <a:rPr lang="de-DE" dirty="0" err="1" smtClean="0"/>
+              <a:t>future</a:t>
+            </a:r>
+            <a:r>
+              <a:rPr lang="de-DE" dirty="0" smtClean="0"/>
+              <a:t> </a:t>
+            </a:r>
+            <a:r>
+              <a:rPr lang="de-DE" dirty="0" err="1" smtClean="0"/>
+              <a:t>solution</a:t>
+            </a:r>
+            <a:r>
+              <a:rPr lang="de-DE" dirty="0" smtClean="0"/>
+              <a:t>: </a:t>
+            </a:r>
+            <a:r>
+              <a:rPr lang="de-DE" dirty="0" err="1" smtClean="0"/>
+              <a:t>generator</a:t>
+            </a:r>
+            <a:r>
+              <a:rPr lang="de-DE" dirty="0" smtClean="0"/>
+              <a:t> </a:t>
+            </a:r>
+            <a:r>
+              <a:rPr lang="de-DE" dirty="0" err="1" smtClean="0"/>
+              <a:t>for</a:t>
+            </a:r>
+            <a:r>
+              <a:rPr lang="de-DE" dirty="0" smtClean="0"/>
+              <a:t> </a:t>
+            </a:r>
+            <a:r>
+              <a:rPr lang="de-DE" dirty="0" err="1" smtClean="0"/>
+              <a:t>settings</a:t>
+            </a:r>
+            <a:r>
+              <a:rPr lang="de-DE" dirty="0" smtClean="0"/>
+              <a:t>?</a:t>
+            </a:r>
           </a:p>
           <a:p>
             <a:endParaRPr lang="de-DE" dirty="0" smtClean="0"/>
@@ -8481,7 +8542,7 @@
         </p:blipFill>
         <p:spPr>
           <a:xfrm>
-            <a:off x="2590800" y="3122826"/>
+            <a:off x="2590800" y="2748043"/>
             <a:ext cx="3949700" cy="2819400"/>
           </a:xfrm>
           <a:prstGeom prst="rect">
@@ -8778,15 +8839,23 @@
                   <a:srgbClr val="000000"/>
                 </a:solidFill>
               </a:rPr>
-              <a:t>DBs: </a:t>
-            </a:r>
-            <a:r>
-              <a:rPr lang="de-DE" dirty="0" err="1" smtClean="0"/>
-              <a:t>Postgresql</a:t>
-            </a:r>
-            <a:r>
-              <a:rPr lang="de-DE" dirty="0" smtClean="0"/>
-              <a:t>, Mysql</a:t>
+              <a:t>DBs</a:t>
+            </a:r>
+            <a:r>
+              <a:rPr lang="de-DE" dirty="0" smtClean="0">
+                <a:solidFill>
+                  <a:srgbClr val="000000"/>
+                </a:solidFill>
+              </a:rPr>
+              <a:t>:</a:t>
+            </a:r>
+            <a:r>
+              <a:rPr lang="de-DE" dirty="0" smtClean="0"/>
+              <a:t> </a:t>
+            </a:r>
+            <a:r>
+              <a:rPr lang="de-DE" dirty="0" smtClean="0"/>
+              <a:t>Mysql</a:t>
             </a:r>
           </a:p>
           <a:p>
@@ -8846,6 +8915,13 @@
   <p:clrMapOvr>
     <a:masterClrMapping/>
   </p:clrMapOvr>
+  <p:timing>
+    <p:tnLst>
+      <p:par>
+        <p:cTn xmlns:p14="http://schemas.microsoft.com/office/powerpoint/2010/main" id="1" dur="indefinite" restart="never" nodeType="tmRoot"/>
+      </p:par>
+    </p:tnLst>
+  </p:timing>
 </p:sld>
 </file>
 
@@ -9254,12 +9330,20 @@
               <a:t>DBs: </a:t>
             </a:r>
             <a:r>
+              <a:rPr lang="de-DE" dirty="0" err="1" smtClean="0">
+                <a:solidFill>
+                  <a:srgbClr val="FF6600"/>
+                </a:solidFill>
+              </a:rPr>
+              <a:t>Postgresql</a:t>
+            </a:r>
+            <a:r>
               <a:rPr lang="de-DE" dirty="0" smtClean="0">
                 <a:solidFill>
                   <a:srgbClr val="FF6600"/>
                 </a:solidFill>
               </a:rPr>
-              <a:t>Oracle</a:t>
+              <a:t>, Oracle</a:t>
             </a:r>
             <a:r>
               <a:rPr lang="de-DE" dirty="0">
@@ -9267,8 +9351,21 @@
                   <a:srgbClr val="FF6600"/>
                 </a:solidFill>
               </a:rPr>
-              <a:t>, DB2</a:t>
-            </a:r>
+              <a:t>, </a:t>
+            </a:r>
+            <a:r>
+              <a:rPr lang="de-DE" dirty="0" smtClean="0">
+                <a:solidFill>
+                  <a:srgbClr val="FF6600"/>
+                </a:solidFill>
+              </a:rPr>
+              <a:t>DB2, Informix</a:t>
+            </a:r>
+            <a:endParaRPr lang="de-DE" dirty="0">
+              <a:solidFill>
+                <a:srgbClr val="FF6600"/>
+              </a:solidFill>
+            </a:endParaRPr>
           </a:p>
           <a:p>
             <a:endParaRPr lang="de-DE" dirty="0"/>
@@ -9953,10 +10050,7 @@
               <a:rPr lang="de-DE" dirty="0" err="1" smtClean="0"/>
               <a:t>tlstester</a:t>
             </a:r>
-            <a:r>
-              <a:rPr lang="de-DE" dirty="0" smtClean="0"/>
-              <a:t>.</a:t>
-            </a:r>
+            <a:endParaRPr lang="de-DE" dirty="0" smtClean="0"/>
           </a:p>
           <a:p>
             <a:r>
@@ -10796,7 +10890,10 @@
               <a:rPr lang="de-DE" dirty="0" err="1" smtClean="0"/>
               <a:t>setup</a:t>
             </a:r>
-            <a:endParaRPr lang="de-DE" dirty="0" smtClean="0"/>
+            <a:r>
+              <a:rPr lang="de-DE" dirty="0" smtClean="0"/>
+              <a:t>?</a:t>
+            </a:r>
           </a:p>
           <a:p>
             <a:endParaRPr lang="de-DE" dirty="0"/>
@@ -11253,12 +11350,8 @@
               <a:buAutoNum type="arabicPeriod"/>
             </a:pPr>
             <a:r>
-              <a:rPr lang="de-DE" dirty="0" err="1" smtClean="0"/>
-              <a:t>add</a:t>
-            </a:r>
-            <a:r>
-              <a:rPr lang="de-DE" dirty="0" smtClean="0"/>
-              <a:t> a </a:t>
+              <a:rPr lang="de-DE" dirty="0" smtClean="0"/>
+              <a:t>Add a </a:t>
             </a:r>
             <a:r>
               <a:rPr lang="de-DE" dirty="0" err="1" smtClean="0"/>

</xml_diff>

<commit_message>
added some tools to the deepsec slides
</commit_message>
<xml_diff>
--- a/presentations/20131122-Deepsec-ACH project.pptx
+++ b/presentations/20131122-Deepsec-ACH project.pptx
@@ -5,10 +5,10 @@
     <p:sldMasterId id="2147483648" r:id="rId1"/>
   </p:sldMasterIdLst>
   <p:notesMasterIdLst>
-    <p:notesMasterId r:id="rId44"/>
+    <p:notesMasterId r:id="rId45"/>
   </p:notesMasterIdLst>
   <p:handoutMasterIdLst>
-    <p:handoutMasterId r:id="rId45"/>
+    <p:handoutMasterId r:id="rId46"/>
   </p:handoutMasterIdLst>
   <p:sldIdLst>
     <p:sldId id="256" r:id="rId2"/>
@@ -44,15 +44,16 @@
     <p:sldId id="295" r:id="rId32"/>
     <p:sldId id="296" r:id="rId33"/>
     <p:sldId id="279" r:id="rId34"/>
-    <p:sldId id="310" r:id="rId35"/>
-    <p:sldId id="297" r:id="rId36"/>
-    <p:sldId id="303" r:id="rId37"/>
-    <p:sldId id="304" r:id="rId38"/>
-    <p:sldId id="305" r:id="rId39"/>
-    <p:sldId id="264" r:id="rId40"/>
-    <p:sldId id="262" r:id="rId41"/>
-    <p:sldId id="275" r:id="rId42"/>
-    <p:sldId id="276" r:id="rId43"/>
+    <p:sldId id="311" r:id="rId35"/>
+    <p:sldId id="310" r:id="rId36"/>
+    <p:sldId id="297" r:id="rId37"/>
+    <p:sldId id="303" r:id="rId38"/>
+    <p:sldId id="304" r:id="rId39"/>
+    <p:sldId id="305" r:id="rId40"/>
+    <p:sldId id="264" r:id="rId41"/>
+    <p:sldId id="262" r:id="rId42"/>
+    <p:sldId id="275" r:id="rId43"/>
+    <p:sldId id="276" r:id="rId44"/>
   </p:sldIdLst>
   <p:sldSz cx="9144000" cy="6858000" type="screen4x3"/>
   <p:notesSz cx="6669088" cy="9753600"/>
@@ -10025,14 +10026,104 @@
         <p:spPr/>
         <p:txBody>
           <a:bodyPr>
-            <a:normAutofit lnSpcReduction="10000"/>
+            <a:normAutofit/>
           </a:bodyPr>
           <a:lstStyle/>
           <a:p>
             <a:r>
+              <a:rPr lang="de-DE" dirty="0"/>
+              <a:t>o</a:t>
+            </a:r>
+            <a:r>
+              <a:rPr lang="de-DE" dirty="0" smtClean="0"/>
+              <a:t>penssl </a:t>
+            </a:r>
+            <a:r>
+              <a:rPr lang="de-DE" dirty="0" err="1" smtClean="0"/>
+              <a:t>s_client</a:t>
+            </a:r>
+            <a:r>
+              <a:rPr lang="de-DE" dirty="0" smtClean="0"/>
+              <a:t>  (</a:t>
+            </a:r>
+            <a:r>
+              <a:rPr lang="de-DE" dirty="0" err="1" smtClean="0"/>
+              <a:t>or</a:t>
+            </a:r>
+            <a:r>
+              <a:rPr lang="de-DE" dirty="0" smtClean="0"/>
+              <a:t> </a:t>
+            </a:r>
+            <a:r>
+              <a:rPr lang="de-DE" dirty="0" err="1" smtClean="0"/>
+              <a:t>gnutls</a:t>
+            </a:r>
+            <a:r>
+              <a:rPr lang="de-DE" dirty="0" smtClean="0"/>
+              <a:t>-cli)</a:t>
+            </a:r>
+          </a:p>
+          <a:p>
+            <a:r>
               <a:rPr lang="de-DE" dirty="0" err="1" smtClean="0"/>
               <a:t>ssllabs.com</a:t>
             </a:r>
+            <a:r>
+              <a:rPr lang="de-DE" dirty="0" smtClean="0"/>
+              <a:t>: </a:t>
+            </a:r>
+            <a:r>
+              <a:rPr lang="de-DE" dirty="0" err="1" smtClean="0"/>
+              <a:t>checks</a:t>
+            </a:r>
+            <a:r>
+              <a:rPr lang="de-DE" dirty="0" smtClean="0"/>
+              <a:t> </a:t>
+            </a:r>
+            <a:r>
+              <a:rPr lang="de-DE" dirty="0" err="1" smtClean="0"/>
+              <a:t>for</a:t>
+            </a:r>
+            <a:r>
+              <a:rPr lang="de-DE" dirty="0" smtClean="0"/>
+              <a:t> </a:t>
+            </a:r>
+            <a:r>
+              <a:rPr lang="de-DE" dirty="0" err="1" smtClean="0"/>
+              <a:t>servers</a:t>
+            </a:r>
+            <a:r>
+              <a:rPr lang="de-DE" dirty="0" smtClean="0"/>
+              <a:t> </a:t>
+            </a:r>
+            <a:r>
+              <a:rPr lang="de-DE" dirty="0" err="1" smtClean="0"/>
+              <a:t>as</a:t>
+            </a:r>
+            <a:r>
+              <a:rPr lang="de-DE" dirty="0" smtClean="0"/>
+              <a:t> </a:t>
+            </a:r>
+            <a:r>
+              <a:rPr lang="de-DE" dirty="0" err="1" smtClean="0"/>
+              <a:t>well</a:t>
+            </a:r>
+            <a:r>
+              <a:rPr lang="de-DE" dirty="0" smtClean="0"/>
+              <a:t> </a:t>
+            </a:r>
+            <a:r>
+              <a:rPr lang="de-DE" dirty="0" err="1" smtClean="0"/>
+              <a:t>as</a:t>
+            </a:r>
+            <a:r>
+              <a:rPr lang="de-DE" dirty="0" smtClean="0"/>
+              <a:t> </a:t>
+            </a:r>
+            <a:r>
+              <a:rPr lang="de-DE" dirty="0" err="1" smtClean="0"/>
+              <a:t>clients</a:t>
+            </a:r>
             <a:endParaRPr lang="de-DE" dirty="0" smtClean="0"/>
           </a:p>
           <a:p>
@@ -10059,102 +10150,6 @@
               <a:t>SSLyze</a:t>
             </a:r>
             <a:endParaRPr lang="de-DE" dirty="0" smtClean="0"/>
-          </a:p>
-          <a:p>
-            <a:r>
-              <a:rPr lang="de-DE" dirty="0" err="1" smtClean="0"/>
-              <a:t>What</a:t>
-            </a:r>
-            <a:r>
-              <a:rPr lang="de-DE" dirty="0" smtClean="0"/>
-              <a:t> </a:t>
-            </a:r>
-            <a:r>
-              <a:rPr lang="de-DE" dirty="0" err="1" smtClean="0"/>
-              <a:t>can</a:t>
-            </a:r>
-            <a:r>
-              <a:rPr lang="de-DE" dirty="0" smtClean="0"/>
-              <a:t> </a:t>
-            </a:r>
-            <a:r>
-              <a:rPr lang="de-DE" dirty="0" err="1" smtClean="0"/>
-              <a:t>people</a:t>
-            </a:r>
-            <a:r>
-              <a:rPr lang="de-DE" dirty="0" smtClean="0"/>
-              <a:t> do </a:t>
-            </a:r>
-            <a:r>
-              <a:rPr lang="de-DE" dirty="0" err="1" smtClean="0"/>
-              <a:t>to</a:t>
-            </a:r>
-            <a:r>
-              <a:rPr lang="de-DE" dirty="0" smtClean="0"/>
-              <a:t> </a:t>
-            </a:r>
-            <a:r>
-              <a:rPr lang="de-DE" dirty="0" err="1" smtClean="0"/>
-              <a:t>test</a:t>
-            </a:r>
-            <a:r>
-              <a:rPr lang="de-DE" dirty="0" smtClean="0"/>
-              <a:t> </a:t>
-            </a:r>
-            <a:r>
-              <a:rPr lang="de-DE" dirty="0" err="1" smtClean="0"/>
-              <a:t>themselves</a:t>
-            </a:r>
-            <a:r>
-              <a:rPr lang="de-DE" dirty="0" smtClean="0"/>
-              <a:t>?</a:t>
-            </a:r>
-          </a:p>
-          <a:p>
-            <a:r>
-              <a:rPr lang="de-DE" dirty="0" err="1" smtClean="0"/>
-              <a:t>What</a:t>
-            </a:r>
-            <a:r>
-              <a:rPr lang="de-DE" dirty="0" smtClean="0"/>
-              <a:t> </a:t>
-            </a:r>
-            <a:r>
-              <a:rPr lang="de-DE" dirty="0" err="1" smtClean="0"/>
-              <a:t>does</a:t>
-            </a:r>
-            <a:r>
-              <a:rPr lang="de-DE" dirty="0"/>
-              <a:t> </a:t>
-            </a:r>
-            <a:r>
-              <a:rPr lang="de-DE" dirty="0" smtClean="0"/>
-              <a:t>a </a:t>
-            </a:r>
-            <a:r>
-              <a:rPr lang="de-DE" dirty="0" err="1" smtClean="0"/>
-              <a:t>test</a:t>
-            </a:r>
-            <a:r>
-              <a:rPr lang="de-DE" dirty="0" smtClean="0"/>
-              <a:t> </a:t>
-            </a:r>
-            <a:r>
-              <a:rPr lang="de-DE" dirty="0" err="1" smtClean="0"/>
-              <a:t>result</a:t>
-            </a:r>
-            <a:r>
-              <a:rPr lang="de-DE" dirty="0" smtClean="0"/>
-              <a:t> </a:t>
-            </a:r>
-            <a:r>
-              <a:rPr lang="de-DE" dirty="0" err="1" smtClean="0"/>
-              <a:t>mean</a:t>
-            </a:r>
-            <a:r>
-              <a:rPr lang="de-DE" dirty="0" smtClean="0"/>
-              <a:t>?</a:t>
-            </a:r>
           </a:p>
           <a:p>
             <a:r>
@@ -10255,6 +10250,158 @@
 </file>
 
 <file path=ppt/slides/slide34.xml><?xml version="1.0" encoding="utf-8"?>
+<p:sld xmlns:a="http://schemas.openxmlformats.org/drawingml/2006/main" xmlns:r="http://schemas.openxmlformats.org/officeDocument/2006/relationships" xmlns:p="http://schemas.openxmlformats.org/presentationml/2006/main">
+  <p:cSld>
+    <p:spTree>
+      <p:nvGrpSpPr>
+        <p:cNvPr id="1" name=""/>
+        <p:cNvGrpSpPr/>
+        <p:nvPr/>
+      </p:nvGrpSpPr>
+      <p:grpSpPr>
+        <a:xfrm>
+          <a:off x="0" y="0"/>
+          <a:ext cx="0" cy="0"/>
+          <a:chOff x="0" y="0"/>
+          <a:chExt cx="0" cy="0"/>
+        </a:xfrm>
+      </p:grpSpPr>
+      <p:sp>
+        <p:nvSpPr>
+          <p:cNvPr id="2" name="Titel 1"/>
+          <p:cNvSpPr>
+            <a:spLocks noGrp="1"/>
+          </p:cNvSpPr>
+          <p:nvPr>
+            <p:ph type="title"/>
+          </p:nvPr>
+        </p:nvSpPr>
+        <p:spPr/>
+        <p:txBody>
+          <a:bodyPr/>
+          <a:lstStyle/>
+          <a:p>
+            <a:r>
+              <a:rPr lang="de-DE" dirty="0" smtClean="0"/>
+              <a:t>Tools: </a:t>
+            </a:r>
+            <a:r>
+              <a:rPr lang="de-DE" dirty="0" err="1" smtClean="0"/>
+              <a:t>openss</a:t>
+            </a:r>
+            <a:r>
+              <a:rPr lang="de-DE" dirty="0" smtClean="0"/>
+              <a:t> </a:t>
+            </a:r>
+            <a:r>
+              <a:rPr lang="de-DE" dirty="0" err="1" smtClean="0"/>
+              <a:t>s_client</a:t>
+            </a:r>
+            <a:endParaRPr lang="de-DE" dirty="0"/>
+          </a:p>
+        </p:txBody>
+      </p:sp>
+      <p:sp>
+        <p:nvSpPr>
+          <p:cNvPr id="3" name="Inhaltsplatzhalter 2"/>
+          <p:cNvSpPr>
+            <a:spLocks noGrp="1"/>
+          </p:cNvSpPr>
+          <p:nvPr>
+            <p:ph idx="1"/>
+          </p:nvPr>
+        </p:nvSpPr>
+        <p:spPr/>
+        <p:txBody>
+          <a:bodyPr>
+            <a:normAutofit/>
+          </a:bodyPr>
+          <a:lstStyle/>
+          <a:p>
+            <a:pPr marL="0" indent="0">
+              <a:buNone/>
+            </a:pPr>
+            <a:r>
+              <a:rPr lang="de-DE" sz="2400" dirty="0"/>
+              <a:t>openssl </a:t>
+            </a:r>
+            <a:r>
+              <a:rPr lang="de-DE" sz="2400" dirty="0" err="1"/>
+              <a:t>s_client</a:t>
+            </a:r>
+            <a:r>
+              <a:rPr lang="de-DE" sz="2400" dirty="0"/>
+              <a:t> -</a:t>
+            </a:r>
+            <a:r>
+              <a:rPr lang="de-DE" sz="2400" dirty="0" err="1"/>
+              <a:t>showcerts</a:t>
+            </a:r>
+            <a:r>
+              <a:rPr lang="de-DE" sz="2400" dirty="0"/>
+              <a:t> </a:t>
+            </a:r>
+            <a:r>
+              <a:rPr lang="de-DE" sz="2400" dirty="0" smtClean="0"/>
+              <a:t>–</a:t>
+            </a:r>
+            <a:r>
+              <a:rPr lang="de-DE" sz="2400" dirty="0" err="1" smtClean="0"/>
+              <a:t>connect</a:t>
+            </a:r>
+            <a:r>
+              <a:rPr lang="de-DE" sz="2400" dirty="0" smtClean="0"/>
+              <a:t> git.bettercrypto.org:443</a:t>
+            </a:r>
+            <a:endParaRPr lang="de-DE" sz="2400" dirty="0"/>
+          </a:p>
+        </p:txBody>
+      </p:sp>
+      <p:pic>
+        <p:nvPicPr>
+          <p:cNvPr id="4" name="Bild 3"/>
+          <p:cNvPicPr>
+            <a:picLocks noChangeAspect="1"/>
+          </p:cNvPicPr>
+          <p:nvPr/>
+        </p:nvPicPr>
+        <p:blipFill>
+          <a:blip r:embed="rId2"/>
+          <a:stretch>
+            <a:fillRect/>
+          </a:stretch>
+        </p:blipFill>
+        <p:spPr>
+          <a:xfrm>
+            <a:off x="0" y="2260263"/>
+            <a:ext cx="9144000" cy="4400489"/>
+          </a:xfrm>
+          <a:prstGeom prst="rect">
+            <a:avLst/>
+          </a:prstGeom>
+        </p:spPr>
+      </p:pic>
+    </p:spTree>
+    <p:extLst>
+      <p:ext uri="{BB962C8B-B14F-4D97-AF65-F5344CB8AC3E}">
+        <p14:creationId xmlns:p14="http://schemas.microsoft.com/office/powerpoint/2010/main" val="2467489511"/>
+      </p:ext>
+    </p:extLst>
+  </p:cSld>
+  <p:clrMapOvr>
+    <a:masterClrMapping/>
+  </p:clrMapOvr>
+  <p:timing>
+    <p:tnLst>
+      <p:par>
+        <p:cTn xmlns:p14="http://schemas.microsoft.com/office/powerpoint/2010/main" id="1" dur="indefinite" restart="never" nodeType="tmRoot"/>
+      </p:par>
+    </p:tnLst>
+  </p:timing>
+</p:sld>
+</file>
+
+<file path=ppt/slides/slide35.xml><?xml version="1.0" encoding="utf-8"?>
 <p:sld xmlns:a="http://schemas.openxmlformats.org/drawingml/2006/main" xmlns:r="http://schemas.openxmlformats.org/officeDocument/2006/relationships" xmlns:p="http://schemas.openxmlformats.org/presentationml/2006/main">
   <p:cSld>
     <p:spTree>
@@ -10342,7 +10489,7 @@
 </p:sld>
 </file>
 
-<file path=ppt/slides/slide35.xml><?xml version="1.0" encoding="utf-8"?>
+<file path=ppt/slides/slide36.xml><?xml version="1.0" encoding="utf-8"?>
 <p:sld xmlns:a="http://schemas.openxmlformats.org/drawingml/2006/main" xmlns:r="http://schemas.openxmlformats.org/officeDocument/2006/relationships" xmlns:p="http://schemas.openxmlformats.org/presentationml/2006/main">
   <p:cSld>
     <p:spTree>
@@ -10455,7 +10602,7 @@
 </p:sld>
 </file>
 
-<file path=ppt/slides/slide36.xml><?xml version="1.0" encoding="utf-8"?>
+<file path=ppt/slides/slide37.xml><?xml version="1.0" encoding="utf-8"?>
 <p:sld xmlns:a="http://schemas.openxmlformats.org/drawingml/2006/main" xmlns:r="http://schemas.openxmlformats.org/officeDocument/2006/relationships" xmlns:p="http://schemas.openxmlformats.org/presentationml/2006/main">
   <p:cSld>
     <p:spTree>
@@ -10547,7 +10694,7 @@
 </p:sld>
 </file>
 
-<file path=ppt/slides/slide37.xml><?xml version="1.0" encoding="utf-8"?>
+<file path=ppt/slides/slide38.xml><?xml version="1.0" encoding="utf-8"?>
 <p:sld xmlns:a="http://schemas.openxmlformats.org/drawingml/2006/main" xmlns:r="http://schemas.openxmlformats.org/officeDocument/2006/relationships" xmlns:p="http://schemas.openxmlformats.org/presentationml/2006/main">
   <p:cSld>
     <p:spTree>
@@ -10635,108 +10782,6 @@
 </p:sld>
 </file>
 
-<file path=ppt/slides/slide38.xml><?xml version="1.0" encoding="utf-8"?>
-<p:sld xmlns:a="http://schemas.openxmlformats.org/drawingml/2006/main" xmlns:r="http://schemas.openxmlformats.org/officeDocument/2006/relationships" xmlns:p="http://schemas.openxmlformats.org/presentationml/2006/main">
-  <p:cSld>
-    <p:spTree>
-      <p:nvGrpSpPr>
-        <p:cNvPr id="1" name=""/>
-        <p:cNvGrpSpPr/>
-        <p:nvPr/>
-      </p:nvGrpSpPr>
-      <p:grpSpPr>
-        <a:xfrm>
-          <a:off x="0" y="0"/>
-          <a:ext cx="0" cy="0"/>
-          <a:chOff x="0" y="0"/>
-          <a:chExt cx="0" cy="0"/>
-        </a:xfrm>
-      </p:grpSpPr>
-      <p:sp>
-        <p:nvSpPr>
-          <p:cNvPr id="4" name="Titel 3"/>
-          <p:cNvSpPr>
-            <a:spLocks noGrp="1"/>
-          </p:cNvSpPr>
-          <p:nvPr>
-            <p:ph type="title"/>
-          </p:nvPr>
-        </p:nvSpPr>
-        <p:spPr/>
-        <p:txBody>
-          <a:bodyPr/>
-          <a:lstStyle/>
-          <a:p>
-            <a:r>
-              <a:rPr lang="de-DE" dirty="0" err="1" smtClean="0"/>
-              <a:t>Wrap-up</a:t>
-            </a:r>
-            <a:endParaRPr lang="de-DE" dirty="0"/>
-          </a:p>
-        </p:txBody>
-      </p:sp>
-      <p:sp>
-        <p:nvSpPr>
-          <p:cNvPr id="5" name="Textplatzhalter 4"/>
-          <p:cNvSpPr>
-            <a:spLocks noGrp="1"/>
-          </p:cNvSpPr>
-          <p:nvPr>
-            <p:ph type="body" idx="1"/>
-          </p:nvPr>
-        </p:nvSpPr>
-        <p:spPr/>
-        <p:txBody>
-          <a:bodyPr/>
-          <a:lstStyle/>
-          <a:p>
-            <a:endParaRPr lang="de-DE"/>
-          </a:p>
-        </p:txBody>
-      </p:sp>
-      <p:sp>
-        <p:nvSpPr>
-          <p:cNvPr id="6" name="Textfeld 5"/>
-          <p:cNvSpPr txBox="1"/>
-          <p:nvPr/>
-        </p:nvSpPr>
-        <p:spPr>
-          <a:xfrm>
-            <a:off x="7297503" y="6126163"/>
-            <a:ext cx="1389297" cy="369332"/>
-          </a:xfrm>
-          <a:prstGeom prst="rect">
-            <a:avLst/>
-          </a:prstGeom>
-          <a:noFill/>
-        </p:spPr>
-        <p:txBody>
-          <a:bodyPr wrap="square" rtlCol="0">
-            <a:spAutoFit/>
-          </a:bodyPr>
-          <a:lstStyle/>
-          <a:p>
-            <a:r>
-              <a:rPr lang="de-DE" dirty="0" smtClean="0"/>
-              <a:t>Aaron</a:t>
-            </a:r>
-            <a:endParaRPr lang="de-DE" dirty="0"/>
-          </a:p>
-        </p:txBody>
-      </p:sp>
-    </p:spTree>
-    <p:extLst>
-      <p:ext uri="{BB962C8B-B14F-4D97-AF65-F5344CB8AC3E}">
-        <p14:creationId xmlns:p14="http://schemas.microsoft.com/office/powerpoint/2010/main" val="4191511598"/>
-      </p:ext>
-    </p:extLst>
-  </p:cSld>
-  <p:clrMapOvr>
-    <a:masterClrMapping/>
-  </p:clrMapOvr>
-</p:sld>
-</file>
-
 <file path=ppt/slides/slide39.xml><?xml version="1.0" encoding="utf-8"?>
 <p:sld xmlns:a="http://schemas.openxmlformats.org/drawingml/2006/main" xmlns:r="http://schemas.openxmlformats.org/officeDocument/2006/relationships" xmlns:p="http://schemas.openxmlformats.org/presentationml/2006/main">
   <p:cSld>
@@ -10756,7 +10801,7 @@
       </p:grpSpPr>
       <p:sp>
         <p:nvSpPr>
-          <p:cNvPr id="2" name="Titel 1"/>
+          <p:cNvPr id="4" name="Titel 3"/>
           <p:cNvSpPr>
             <a:spLocks noGrp="1"/>
           </p:cNvSpPr>
@@ -10771,27 +10816,7 @@
           <a:p>
             <a:r>
               <a:rPr lang="de-DE" dirty="0" err="1" smtClean="0"/>
-              <a:t>Current</a:t>
-            </a:r>
-            <a:r>
-              <a:rPr lang="de-DE" dirty="0" smtClean="0"/>
-              <a:t> </a:t>
-            </a:r>
-            <a:r>
-              <a:rPr lang="de-DE" dirty="0" err="1" smtClean="0"/>
-              <a:t>state</a:t>
-            </a:r>
-            <a:r>
-              <a:rPr lang="de-DE" dirty="0" smtClean="0"/>
-              <a:t> </a:t>
-            </a:r>
-            <a:r>
-              <a:rPr lang="de-DE" dirty="0" err="1" smtClean="0"/>
-              <a:t>as</a:t>
-            </a:r>
-            <a:r>
-              <a:rPr lang="de-DE" dirty="0" smtClean="0"/>
-              <a:t> of 2013/11/22</a:t>
+              <a:t>Wrap-up</a:t>
             </a:r>
             <a:endParaRPr lang="de-DE" dirty="0"/>
           </a:p>
@@ -10799,12 +10824,12 @@
       </p:sp>
       <p:sp>
         <p:nvSpPr>
-          <p:cNvPr id="3" name="Inhaltsplatzhalter 2"/>
-          <p:cNvSpPr>
-            <a:spLocks noGrp="1"/>
-          </p:cNvSpPr>
-          <p:nvPr>
-            <p:ph idx="1"/>
+          <p:cNvPr id="5" name="Textplatzhalter 4"/>
+          <p:cNvSpPr>
+            <a:spLocks noGrp="1"/>
+          </p:cNvSpPr>
+          <p:nvPr>
+            <p:ph type="body" idx="1"/>
           </p:nvPr>
         </p:nvSpPr>
         <p:spPr/>
@@ -10812,190 +10837,13 @@
           <a:bodyPr/>
           <a:lstStyle/>
           <a:p>
-            <a:pPr>
-              <a:buFont typeface="Wingdings" charset="2"/>
-              <a:buChar char="ü"/>
-            </a:pPr>
-            <a:r>
-              <a:rPr lang="de-DE" dirty="0" smtClean="0"/>
-              <a:t>Solid </a:t>
-            </a:r>
-            <a:r>
-              <a:rPr lang="de-DE" dirty="0" err="1" smtClean="0"/>
-              <a:t>basis</a:t>
-            </a:r>
-            <a:r>
-              <a:rPr lang="de-DE" dirty="0" smtClean="0"/>
-              <a:t> </a:t>
-            </a:r>
-            <a:r>
-              <a:rPr lang="de-DE" dirty="0" err="1" smtClean="0"/>
-              <a:t>with</a:t>
-            </a:r>
-            <a:r>
-              <a:rPr lang="de-DE" dirty="0" smtClean="0"/>
-              <a:t> Variant (A) </a:t>
-            </a:r>
-            <a:r>
-              <a:rPr lang="de-DE" dirty="0" err="1" smtClean="0"/>
-              <a:t>and</a:t>
-            </a:r>
-            <a:r>
-              <a:rPr lang="de-DE" dirty="0" smtClean="0"/>
-              <a:t> (B)</a:t>
-            </a:r>
-          </a:p>
-          <a:p>
-            <a:r>
-              <a:rPr lang="de-DE" dirty="0" err="1" smtClean="0"/>
-              <a:t>Section</a:t>
-            </a:r>
-            <a:r>
-              <a:rPr lang="de-DE" dirty="0" smtClean="0"/>
-              <a:t> „</a:t>
-            </a:r>
-            <a:r>
-              <a:rPr lang="de-DE" dirty="0" err="1" smtClean="0"/>
-              <a:t>cipher</a:t>
-            </a:r>
-            <a:r>
-              <a:rPr lang="de-DE" dirty="0" smtClean="0"/>
-              <a:t> </a:t>
-            </a:r>
-            <a:r>
-              <a:rPr lang="de-DE" dirty="0" err="1" smtClean="0"/>
-              <a:t>suites</a:t>
-            </a:r>
-            <a:r>
-              <a:rPr lang="de-DE" dirty="0" smtClean="0"/>
-              <a:t>“ still a </a:t>
-            </a:r>
-            <a:r>
-              <a:rPr lang="de-DE" dirty="0" err="1" smtClean="0"/>
-              <a:t>bit</a:t>
-            </a:r>
-            <a:r>
-              <a:rPr lang="de-DE" dirty="0" smtClean="0"/>
-              <a:t> </a:t>
-            </a:r>
-            <a:r>
-              <a:rPr lang="de-DE" dirty="0" err="1" smtClean="0"/>
-              <a:t>messy</a:t>
-            </a:r>
-            <a:r>
-              <a:rPr lang="de-DE" dirty="0" smtClean="0"/>
-              <a:t>, </a:t>
-            </a:r>
-            <a:r>
-              <a:rPr lang="de-DE" dirty="0" err="1" smtClean="0"/>
-              <a:t>needs</a:t>
-            </a:r>
-            <a:r>
-              <a:rPr lang="de-DE" dirty="0" smtClean="0"/>
-              <a:t> </a:t>
-            </a:r>
-            <a:r>
-              <a:rPr lang="de-DE" dirty="0" err="1" smtClean="0"/>
-              <a:t>more</a:t>
-            </a:r>
-            <a:r>
-              <a:rPr lang="de-DE" dirty="0" smtClean="0"/>
-              <a:t> </a:t>
-            </a:r>
-            <a:r>
-              <a:rPr lang="de-DE" dirty="0" err="1" smtClean="0"/>
-              <a:t>work</a:t>
-            </a:r>
-            <a:endParaRPr lang="de-DE" dirty="0" smtClean="0"/>
-          </a:p>
-          <a:p>
-            <a:r>
-              <a:rPr lang="de-DE" dirty="0" err="1" smtClean="0"/>
-              <a:t>Section</a:t>
-            </a:r>
-            <a:r>
-              <a:rPr lang="de-DE" dirty="0" smtClean="0"/>
-              <a:t> „</a:t>
-            </a:r>
-            <a:r>
-              <a:rPr lang="de-DE" dirty="0" err="1" smtClean="0"/>
-              <a:t>practical</a:t>
-            </a:r>
-            <a:r>
-              <a:rPr lang="de-DE" dirty="0" smtClean="0"/>
-              <a:t> </a:t>
-            </a:r>
-            <a:r>
-              <a:rPr lang="de-DE" dirty="0" err="1" smtClean="0"/>
-              <a:t>settings</a:t>
-            </a:r>
-            <a:r>
-              <a:rPr lang="de-DE" dirty="0" smtClean="0"/>
-              <a:t>“ – WIP. Need </a:t>
-            </a:r>
-            <a:r>
-              <a:rPr lang="de-DE" dirty="0" err="1" smtClean="0"/>
-              <a:t>more</a:t>
-            </a:r>
-            <a:r>
-              <a:rPr lang="de-DE" dirty="0" smtClean="0"/>
-              <a:t> </a:t>
-            </a:r>
-            <a:r>
-              <a:rPr lang="de-DE" dirty="0" err="1" smtClean="0"/>
-              <a:t>input</a:t>
-            </a:r>
-            <a:r>
-              <a:rPr lang="de-DE" dirty="0" smtClean="0"/>
-              <a:t> on VPNs, PGP, SSH, IPMI, SIP, XMPP, DBs</a:t>
-            </a:r>
-          </a:p>
-          <a:p>
-            <a:r>
-              <a:rPr lang="de-DE" dirty="0" smtClean="0"/>
-              <a:t>Need </a:t>
-            </a:r>
-            <a:r>
-              <a:rPr lang="de-DE" dirty="0" err="1" smtClean="0"/>
-              <a:t>to</a:t>
-            </a:r>
-            <a:r>
-              <a:rPr lang="de-DE" dirty="0" smtClean="0"/>
-              <a:t> </a:t>
-            </a:r>
-            <a:r>
-              <a:rPr lang="de-DE" dirty="0" err="1" smtClean="0"/>
-              <a:t>build</a:t>
-            </a:r>
-            <a:r>
-              <a:rPr lang="de-DE" dirty="0" smtClean="0"/>
-              <a:t> </a:t>
-            </a:r>
-            <a:r>
-              <a:rPr lang="de-DE" dirty="0" err="1" smtClean="0"/>
-              <a:t>testing</a:t>
-            </a:r>
-            <a:r>
-              <a:rPr lang="de-DE" dirty="0" smtClean="0"/>
-              <a:t> </a:t>
-            </a:r>
-            <a:r>
-              <a:rPr lang="de-DE" dirty="0" err="1" smtClean="0"/>
-              <a:t>setup</a:t>
-            </a:r>
-            <a:r>
-              <a:rPr lang="de-DE" dirty="0" smtClean="0"/>
-              <a:t>?</a:t>
-            </a:r>
-          </a:p>
-          <a:p>
-            <a:endParaRPr lang="de-DE" dirty="0"/>
-          </a:p>
-        </p:txBody>
-      </p:sp>
-      <p:sp>
-        <p:nvSpPr>
-          <p:cNvPr id="4" name="Textfeld 3"/>
+            <a:endParaRPr lang="de-DE"/>
+          </a:p>
+        </p:txBody>
+      </p:sp>
+      <p:sp>
+        <p:nvSpPr>
+          <p:cNvPr id="6" name="Textfeld 5"/>
           <p:cNvSpPr txBox="1"/>
           <p:nvPr/>
         </p:nvSpPr>
@@ -11026,7 +10874,7 @@
     </p:spTree>
     <p:extLst>
       <p:ext uri="{BB962C8B-B14F-4D97-AF65-F5344CB8AC3E}">
-        <p14:creationId xmlns:p14="http://schemas.microsoft.com/office/powerpoint/2010/main" val="51044277"/>
+        <p14:creationId xmlns:p14="http://schemas.microsoft.com/office/powerpoint/2010/main" val="4191511598"/>
       </p:ext>
     </p:extLst>
   </p:cSld>
@@ -11218,18 +11066,194 @@
         </p:nvSpPr>
         <p:spPr/>
         <p:txBody>
-          <a:bodyPr>
-            <a:normAutofit/>
-          </a:bodyPr>
-          <a:lstStyle/>
-          <a:p>
-            <a:r>
-              <a:rPr lang="de-DE" dirty="0" err="1" smtClean="0"/>
-              <a:t>How</a:t>
-            </a:r>
-            <a:r>
-              <a:rPr lang="de-DE" dirty="0" smtClean="0"/>
-              <a:t> </a:t>
+          <a:bodyPr/>
+          <a:lstStyle/>
+          <a:p>
+            <a:r>
+              <a:rPr lang="de-DE" dirty="0" err="1" smtClean="0"/>
+              <a:t>Current</a:t>
+            </a:r>
+            <a:r>
+              <a:rPr lang="de-DE" dirty="0" smtClean="0"/>
+              <a:t> </a:t>
+            </a:r>
+            <a:r>
+              <a:rPr lang="de-DE" dirty="0" err="1" smtClean="0"/>
+              <a:t>state</a:t>
+            </a:r>
+            <a:r>
+              <a:rPr lang="de-DE" dirty="0" smtClean="0"/>
+              <a:t> </a:t>
+            </a:r>
+            <a:r>
+              <a:rPr lang="de-DE" dirty="0" err="1" smtClean="0"/>
+              <a:t>as</a:t>
+            </a:r>
+            <a:r>
+              <a:rPr lang="de-DE" dirty="0" smtClean="0"/>
+              <a:t> of 2013/11/22</a:t>
+            </a:r>
+            <a:endParaRPr lang="de-DE" dirty="0"/>
+          </a:p>
+        </p:txBody>
+      </p:sp>
+      <p:sp>
+        <p:nvSpPr>
+          <p:cNvPr id="3" name="Inhaltsplatzhalter 2"/>
+          <p:cNvSpPr>
+            <a:spLocks noGrp="1"/>
+          </p:cNvSpPr>
+          <p:nvPr>
+            <p:ph idx="1"/>
+          </p:nvPr>
+        </p:nvSpPr>
+        <p:spPr/>
+        <p:txBody>
+          <a:bodyPr/>
+          <a:lstStyle/>
+          <a:p>
+            <a:pPr>
+              <a:buFont typeface="Wingdings" charset="2"/>
+              <a:buChar char="ü"/>
+            </a:pPr>
+            <a:r>
+              <a:rPr lang="de-DE" dirty="0" smtClean="0"/>
+              <a:t>Solid </a:t>
+            </a:r>
+            <a:r>
+              <a:rPr lang="de-DE" dirty="0" err="1" smtClean="0"/>
+              <a:t>basis</a:t>
+            </a:r>
+            <a:r>
+              <a:rPr lang="de-DE" dirty="0" smtClean="0"/>
+              <a:t> </a:t>
+            </a:r>
+            <a:r>
+              <a:rPr lang="de-DE" dirty="0" err="1" smtClean="0"/>
+              <a:t>with</a:t>
+            </a:r>
+            <a:r>
+              <a:rPr lang="de-DE" dirty="0" smtClean="0"/>
+              <a:t> Variant (A) </a:t>
+            </a:r>
+            <a:r>
+              <a:rPr lang="de-DE" dirty="0" err="1" smtClean="0"/>
+              <a:t>and</a:t>
+            </a:r>
+            <a:r>
+              <a:rPr lang="de-DE" dirty="0" smtClean="0"/>
+              <a:t> (B)</a:t>
+            </a:r>
+          </a:p>
+          <a:p>
+            <a:r>
+              <a:rPr lang="de-DE" dirty="0" err="1" smtClean="0"/>
+              <a:t>Section</a:t>
+            </a:r>
+            <a:r>
+              <a:rPr lang="de-DE" dirty="0" smtClean="0"/>
+              <a:t> „</a:t>
+            </a:r>
+            <a:r>
+              <a:rPr lang="de-DE" dirty="0" err="1" smtClean="0"/>
+              <a:t>cipher</a:t>
+            </a:r>
+            <a:r>
+              <a:rPr lang="de-DE" dirty="0" smtClean="0"/>
+              <a:t> </a:t>
+            </a:r>
+            <a:r>
+              <a:rPr lang="de-DE" dirty="0" err="1" smtClean="0"/>
+              <a:t>suites</a:t>
+            </a:r>
+            <a:r>
+              <a:rPr lang="de-DE" dirty="0" smtClean="0"/>
+              <a:t>“ still a </a:t>
+            </a:r>
+            <a:r>
+              <a:rPr lang="de-DE" dirty="0" err="1" smtClean="0"/>
+              <a:t>bit</a:t>
+            </a:r>
+            <a:r>
+              <a:rPr lang="de-DE" dirty="0" smtClean="0"/>
+              <a:t> </a:t>
+            </a:r>
+            <a:r>
+              <a:rPr lang="de-DE" dirty="0" err="1" smtClean="0"/>
+              <a:t>messy</a:t>
+            </a:r>
+            <a:r>
+              <a:rPr lang="de-DE" dirty="0" smtClean="0"/>
+              <a:t>, </a:t>
+            </a:r>
+            <a:r>
+              <a:rPr lang="de-DE" dirty="0" err="1" smtClean="0"/>
+              <a:t>needs</a:t>
+            </a:r>
+            <a:r>
+              <a:rPr lang="de-DE" dirty="0" smtClean="0"/>
+              <a:t> </a:t>
+            </a:r>
+            <a:r>
+              <a:rPr lang="de-DE" dirty="0" err="1" smtClean="0"/>
+              <a:t>more</a:t>
+            </a:r>
+            <a:r>
+              <a:rPr lang="de-DE" dirty="0" smtClean="0"/>
+              <a:t> </a:t>
+            </a:r>
+            <a:r>
+              <a:rPr lang="de-DE" dirty="0" err="1" smtClean="0"/>
+              <a:t>work</a:t>
+            </a:r>
+            <a:endParaRPr lang="de-DE" dirty="0" smtClean="0"/>
+          </a:p>
+          <a:p>
+            <a:r>
+              <a:rPr lang="de-DE" dirty="0" err="1" smtClean="0"/>
+              <a:t>Section</a:t>
+            </a:r>
+            <a:r>
+              <a:rPr lang="de-DE" dirty="0" smtClean="0"/>
+              <a:t> „</a:t>
+            </a:r>
+            <a:r>
+              <a:rPr lang="de-DE" dirty="0" err="1" smtClean="0"/>
+              <a:t>practical</a:t>
+            </a:r>
+            <a:r>
+              <a:rPr lang="de-DE" dirty="0" smtClean="0"/>
+              <a:t> </a:t>
+            </a:r>
+            <a:r>
+              <a:rPr lang="de-DE" dirty="0" err="1" smtClean="0"/>
+              <a:t>settings</a:t>
+            </a:r>
+            <a:r>
+              <a:rPr lang="de-DE" dirty="0" smtClean="0"/>
+              <a:t>“ – WIP. Need </a:t>
+            </a:r>
+            <a:r>
+              <a:rPr lang="de-DE" dirty="0" err="1" smtClean="0"/>
+              <a:t>more</a:t>
+            </a:r>
+            <a:r>
+              <a:rPr lang="de-DE" dirty="0" smtClean="0"/>
+              <a:t> </a:t>
+            </a:r>
+            <a:r>
+              <a:rPr lang="de-DE" dirty="0" err="1" smtClean="0"/>
+              <a:t>input</a:t>
+            </a:r>
+            <a:r>
+              <a:rPr lang="de-DE" dirty="0" smtClean="0"/>
+              <a:t> on VPNs, PGP, SSH, IPMI, SIP, XMPP, DBs</a:t>
+            </a:r>
+          </a:p>
+          <a:p>
+            <a:r>
+              <a:rPr lang="de-DE" dirty="0" smtClean="0"/>
+              <a:t>Need </a:t>
             </a:r>
             <a:r>
               <a:rPr lang="de-DE" dirty="0" err="1" smtClean="0"/>
@@ -11241,413 +11265,31 @@
             </a:r>
             <a:r>
               <a:rPr lang="de-DE" dirty="0" err="1" smtClean="0"/>
-              <a:t>participate</a:t>
-            </a:r>
+              <a:t>build</a:t>
+            </a:r>
+            <a:r>
+              <a:rPr lang="de-DE" dirty="0" smtClean="0"/>
+              <a:t> </a:t>
+            </a:r>
+            <a:r>
+              <a:rPr lang="de-DE" dirty="0" err="1" smtClean="0"/>
+              <a:t>testing</a:t>
+            </a:r>
+            <a:r>
+              <a:rPr lang="de-DE" dirty="0" smtClean="0"/>
+              <a:t> </a:t>
+            </a:r>
+            <a:r>
+              <a:rPr lang="de-DE" dirty="0" err="1" smtClean="0"/>
+              <a:t>setup</a:t>
+            </a:r>
+            <a:r>
+              <a:rPr lang="de-DE" dirty="0" smtClean="0"/>
+              <a:t>?</a:t>
+            </a:r>
+          </a:p>
+          <a:p>
             <a:endParaRPr lang="de-DE" dirty="0"/>
-          </a:p>
-        </p:txBody>
-      </p:sp>
-      <p:sp>
-        <p:nvSpPr>
-          <p:cNvPr id="3" name="Inhaltsplatzhalter 2"/>
-          <p:cNvSpPr>
-            <a:spLocks noGrp="1"/>
-          </p:cNvSpPr>
-          <p:nvPr>
-            <p:ph idx="1"/>
-          </p:nvPr>
-        </p:nvSpPr>
-        <p:spPr/>
-        <p:txBody>
-          <a:bodyPr>
-            <a:normAutofit fontScale="85000" lnSpcReduction="20000"/>
-          </a:bodyPr>
-          <a:lstStyle/>
-          <a:p>
-            <a:pPr marL="514350" indent="-514350">
-              <a:buFont typeface="+mj-lt"/>
-              <a:buAutoNum type="arabicPeriod"/>
-            </a:pPr>
-            <a:r>
-              <a:rPr lang="de-DE" dirty="0" err="1" smtClean="0"/>
-              <a:t>We</a:t>
-            </a:r>
-            <a:r>
-              <a:rPr lang="de-DE" dirty="0" smtClean="0"/>
-              <a:t> </a:t>
-            </a:r>
-            <a:r>
-              <a:rPr lang="de-DE" dirty="0" err="1" smtClean="0"/>
-              <a:t>need</a:t>
-            </a:r>
-            <a:r>
-              <a:rPr lang="de-DE" dirty="0" smtClean="0"/>
-              <a:t>: </a:t>
-            </a:r>
-            <a:r>
-              <a:rPr lang="de-DE" dirty="0" err="1" smtClean="0"/>
-              <a:t>cryptologists</a:t>
-            </a:r>
-            <a:r>
-              <a:rPr lang="de-DE" dirty="0" smtClean="0"/>
-              <a:t>, sysadmins, </a:t>
-            </a:r>
-            <a:r>
-              <a:rPr lang="de-DE" dirty="0" err="1" smtClean="0"/>
-              <a:t>hackers</a:t>
-            </a:r>
-            <a:endParaRPr lang="de-DE" dirty="0" smtClean="0"/>
-          </a:p>
-          <a:p>
-            <a:pPr marL="514350" indent="-514350">
-              <a:buFont typeface="+mj-lt"/>
-              <a:buAutoNum type="arabicPeriod"/>
-            </a:pPr>
-            <a:r>
-              <a:rPr lang="de-DE" dirty="0" smtClean="0"/>
-              <a:t>Read </a:t>
-            </a:r>
-            <a:r>
-              <a:rPr lang="de-DE" dirty="0" err="1" smtClean="0"/>
-              <a:t>the</a:t>
-            </a:r>
-            <a:r>
-              <a:rPr lang="de-DE" dirty="0" smtClean="0"/>
-              <a:t> </a:t>
-            </a:r>
-            <a:r>
-              <a:rPr lang="de-DE" dirty="0" err="1" smtClean="0"/>
-              <a:t>document</a:t>
-            </a:r>
-            <a:r>
-              <a:rPr lang="de-DE" dirty="0" smtClean="0"/>
-              <a:t>, find </a:t>
-            </a:r>
-            <a:r>
-              <a:rPr lang="de-DE" dirty="0" err="1" smtClean="0"/>
-              <a:t>bugs</a:t>
-            </a:r>
-            <a:endParaRPr lang="de-DE" dirty="0" smtClean="0"/>
-          </a:p>
-          <a:p>
-            <a:pPr marL="514350" indent="-514350">
-              <a:buFont typeface="+mj-lt"/>
-              <a:buAutoNum type="arabicPeriod"/>
-            </a:pPr>
-            <a:r>
-              <a:rPr lang="de-DE" dirty="0" err="1" smtClean="0"/>
-              <a:t>Subscribe</a:t>
-            </a:r>
-            <a:r>
-              <a:rPr lang="de-DE" dirty="0" smtClean="0"/>
-              <a:t> </a:t>
-            </a:r>
-            <a:r>
-              <a:rPr lang="de-DE" dirty="0" err="1" smtClean="0"/>
-              <a:t>to</a:t>
-            </a:r>
-            <a:r>
-              <a:rPr lang="de-DE" dirty="0" smtClean="0"/>
-              <a:t> </a:t>
-            </a:r>
-            <a:r>
-              <a:rPr lang="de-DE" dirty="0" err="1" smtClean="0"/>
-              <a:t>the</a:t>
-            </a:r>
-            <a:r>
-              <a:rPr lang="de-DE" dirty="0" smtClean="0"/>
-              <a:t> </a:t>
-            </a:r>
-            <a:r>
-              <a:rPr lang="de-DE" dirty="0" err="1" smtClean="0"/>
-              <a:t>mailing</a:t>
-            </a:r>
-            <a:r>
-              <a:rPr lang="de-DE" dirty="0" smtClean="0"/>
-              <a:t> </a:t>
-            </a:r>
-            <a:r>
-              <a:rPr lang="de-DE" dirty="0" err="1" smtClean="0"/>
-              <a:t>list</a:t>
-            </a:r>
-            <a:endParaRPr lang="de-DE" dirty="0" smtClean="0"/>
-          </a:p>
-          <a:p>
-            <a:pPr marL="514350" indent="-514350">
-              <a:buFont typeface="+mj-lt"/>
-              <a:buAutoNum type="arabicPeriod"/>
-            </a:pPr>
-            <a:r>
-              <a:rPr lang="de-DE" dirty="0" err="1" smtClean="0"/>
-              <a:t>Understand</a:t>
-            </a:r>
-            <a:r>
-              <a:rPr lang="de-DE" dirty="0" smtClean="0"/>
-              <a:t> </a:t>
-            </a:r>
-            <a:r>
-              <a:rPr lang="de-DE" dirty="0" err="1" smtClean="0"/>
-              <a:t>the</a:t>
-            </a:r>
-            <a:r>
-              <a:rPr lang="de-DE" dirty="0" smtClean="0"/>
-              <a:t> </a:t>
-            </a:r>
-            <a:r>
-              <a:rPr lang="de-DE" dirty="0" err="1" smtClean="0"/>
-              <a:t>cipher</a:t>
-            </a:r>
-            <a:r>
-              <a:rPr lang="de-DE" dirty="0" smtClean="0"/>
-              <a:t> </a:t>
-            </a:r>
-            <a:r>
-              <a:rPr lang="de-DE" dirty="0" err="1" smtClean="0"/>
-              <a:t>strings</a:t>
-            </a:r>
-            <a:r>
-              <a:rPr lang="de-DE" dirty="0" smtClean="0"/>
-              <a:t> Variant (A) </a:t>
-            </a:r>
-            <a:r>
-              <a:rPr lang="de-DE" dirty="0" err="1" smtClean="0"/>
-              <a:t>and</a:t>
-            </a:r>
-            <a:r>
-              <a:rPr lang="de-DE" dirty="0" smtClean="0"/>
-              <a:t> (B) </a:t>
-            </a:r>
-            <a:r>
-              <a:rPr lang="de-DE" dirty="0" err="1" smtClean="0"/>
-              <a:t>before</a:t>
-            </a:r>
-            <a:r>
-              <a:rPr lang="de-DE" dirty="0" smtClean="0"/>
-              <a:t> </a:t>
-            </a:r>
-            <a:r>
-              <a:rPr lang="de-DE" dirty="0" err="1" smtClean="0"/>
-              <a:t>proposing</a:t>
-            </a:r>
-            <a:r>
-              <a:rPr lang="de-DE" dirty="0" smtClean="0"/>
-              <a:t> </a:t>
-            </a:r>
-            <a:r>
-              <a:rPr lang="de-DE" dirty="0" err="1" smtClean="0"/>
-              <a:t>some</a:t>
-            </a:r>
-            <a:r>
-              <a:rPr lang="de-DE" dirty="0" smtClean="0"/>
-              <a:t> </a:t>
-            </a:r>
-            <a:r>
-              <a:rPr lang="de-DE" dirty="0" err="1" smtClean="0"/>
-              <a:t>changes</a:t>
-            </a:r>
-            <a:endParaRPr lang="de-DE" dirty="0" smtClean="0"/>
-          </a:p>
-          <a:p>
-            <a:pPr marL="514350" indent="-514350">
-              <a:buFont typeface="+mj-lt"/>
-              <a:buAutoNum type="arabicPeriod"/>
-            </a:pPr>
-            <a:r>
-              <a:rPr lang="de-DE" dirty="0" err="1" smtClean="0"/>
-              <a:t>If</a:t>
-            </a:r>
-            <a:r>
-              <a:rPr lang="de-DE" dirty="0" smtClean="0"/>
-              <a:t> </a:t>
-            </a:r>
-            <a:r>
-              <a:rPr lang="de-DE" dirty="0" err="1" smtClean="0"/>
-              <a:t>you</a:t>
-            </a:r>
-            <a:r>
-              <a:rPr lang="de-DE" dirty="0" smtClean="0"/>
-              <a:t> </a:t>
-            </a:r>
-            <a:r>
-              <a:rPr lang="de-DE" dirty="0" err="1" smtClean="0"/>
-              <a:t>propose</a:t>
-            </a:r>
-            <a:r>
-              <a:rPr lang="de-DE" dirty="0" smtClean="0"/>
-              <a:t> a </a:t>
-            </a:r>
-            <a:r>
-              <a:rPr lang="de-DE" dirty="0" err="1" smtClean="0"/>
-              <a:t>new</a:t>
-            </a:r>
-            <a:r>
-              <a:rPr lang="de-DE" dirty="0" smtClean="0"/>
-              <a:t> </a:t>
-            </a:r>
-            <a:r>
-              <a:rPr lang="de-DE" dirty="0" err="1" smtClean="0"/>
-              <a:t>subsection</a:t>
-            </a:r>
-            <a:r>
-              <a:rPr lang="de-DE" dirty="0" smtClean="0"/>
-              <a:t>, </a:t>
-            </a:r>
-            <a:r>
-              <a:rPr lang="de-DE" dirty="0" err="1" smtClean="0"/>
-              <a:t>make</a:t>
-            </a:r>
-            <a:r>
-              <a:rPr lang="de-DE" dirty="0" smtClean="0"/>
-              <a:t> a sample </a:t>
-            </a:r>
-            <a:r>
-              <a:rPr lang="de-DE" dirty="0" err="1" smtClean="0"/>
-              <a:t>config</a:t>
-            </a:r>
-            <a:r>
-              <a:rPr lang="de-DE" dirty="0" smtClean="0"/>
-              <a:t> </a:t>
-            </a:r>
-            <a:r>
-              <a:rPr lang="de-DE" dirty="0" err="1" smtClean="0"/>
-              <a:t>with</a:t>
-            </a:r>
-            <a:r>
-              <a:rPr lang="de-DE" dirty="0" smtClean="0"/>
-              <a:t> variant (B)</a:t>
-            </a:r>
-            <a:endParaRPr lang="de-DE" dirty="0" smtClean="0"/>
-          </a:p>
-          <a:p>
-            <a:pPr marL="514350" indent="-514350">
-              <a:buFont typeface="+mj-lt"/>
-              <a:buAutoNum type="arabicPeriod"/>
-            </a:pPr>
-            <a:r>
-              <a:rPr lang="de-DE" dirty="0" err="1" smtClean="0"/>
-              <a:t>Git</a:t>
-            </a:r>
-            <a:r>
-              <a:rPr lang="de-DE" dirty="0" smtClean="0"/>
-              <a:t> </a:t>
-            </a:r>
-            <a:r>
-              <a:rPr lang="de-DE" dirty="0" err="1" smtClean="0"/>
-              <a:t>repo</a:t>
-            </a:r>
-            <a:r>
-              <a:rPr lang="de-DE" dirty="0" smtClean="0"/>
-              <a:t> </a:t>
-            </a:r>
-            <a:r>
-              <a:rPr lang="de-DE" dirty="0" err="1" smtClean="0"/>
-              <a:t>is</a:t>
-            </a:r>
-            <a:r>
-              <a:rPr lang="de-DE" dirty="0" smtClean="0"/>
-              <a:t> </a:t>
-            </a:r>
-            <a:r>
-              <a:rPr lang="de-DE" dirty="0" err="1" smtClean="0"/>
-              <a:t>world</a:t>
-            </a:r>
-            <a:r>
-              <a:rPr lang="de-DE" dirty="0" err="1" smtClean="0"/>
-              <a:t>-</a:t>
-            </a:r>
-            <a:r>
-              <a:rPr lang="de-DE" dirty="0" err="1" smtClean="0"/>
-              <a:t>readable</a:t>
-            </a:r>
-            <a:endParaRPr lang="de-DE" dirty="0" smtClean="0"/>
-          </a:p>
-          <a:p>
-            <a:pPr marL="514350" indent="-514350">
-              <a:buFont typeface="+mj-lt"/>
-              <a:buAutoNum type="arabicPeriod"/>
-            </a:pPr>
-            <a:r>
-              <a:rPr lang="de-DE" dirty="0" err="1" smtClean="0"/>
-              <a:t>We</a:t>
-            </a:r>
-            <a:r>
-              <a:rPr lang="de-DE" dirty="0" smtClean="0"/>
-              <a:t> </a:t>
-            </a:r>
-            <a:r>
-              <a:rPr lang="de-DE" dirty="0" err="1" smtClean="0"/>
-              <a:t>need</a:t>
-            </a:r>
-            <a:r>
-              <a:rPr lang="de-DE" dirty="0" smtClean="0"/>
-              <a:t>: </a:t>
-            </a:r>
-          </a:p>
-          <a:p>
-            <a:pPr marL="914400" lvl="1" indent="-514350">
-              <a:buFont typeface="+mj-lt"/>
-              <a:buAutoNum type="arabicPeriod"/>
-            </a:pPr>
-            <a:r>
-              <a:rPr lang="de-DE" dirty="0" smtClean="0"/>
-              <a:t>Add a </a:t>
-            </a:r>
-            <a:r>
-              <a:rPr lang="de-DE" dirty="0" err="1" smtClean="0"/>
-              <a:t>subsection</a:t>
-            </a:r>
-            <a:r>
-              <a:rPr lang="de-DE" dirty="0" smtClean="0"/>
-              <a:t> </a:t>
-            </a:r>
-            <a:r>
-              <a:rPr lang="de-DE" dirty="0" err="1" smtClean="0"/>
-              <a:t>from</a:t>
-            </a:r>
-            <a:r>
-              <a:rPr lang="de-DE" dirty="0" smtClean="0"/>
-              <a:t> </a:t>
-            </a:r>
-            <a:r>
-              <a:rPr lang="de-DE" dirty="0" err="1" smtClean="0"/>
-              <a:t>the</a:t>
-            </a:r>
-            <a:r>
-              <a:rPr lang="de-DE" dirty="0" smtClean="0"/>
-              <a:t> TODO </a:t>
-            </a:r>
-            <a:r>
-              <a:rPr lang="de-DE" dirty="0" err="1" smtClean="0"/>
-              <a:t>list</a:t>
-            </a:r>
-            <a:endParaRPr lang="de-DE" dirty="0" smtClean="0"/>
-          </a:p>
-          <a:p>
-            <a:pPr marL="914400" lvl="1" indent="-514350">
-              <a:buFont typeface="+mj-lt"/>
-              <a:buAutoNum type="arabicPeriod"/>
-            </a:pPr>
-            <a:r>
-              <a:rPr lang="de-DE" b="1" dirty="0" err="1" smtClean="0">
-                <a:solidFill>
-                  <a:srgbClr val="008000"/>
-                </a:solidFill>
-              </a:rPr>
-              <a:t>Reviewers</a:t>
-            </a:r>
-            <a:r>
-              <a:rPr lang="de-DE" b="1" dirty="0" smtClean="0">
-                <a:solidFill>
-                  <a:srgbClr val="008000"/>
-                </a:solidFill>
-              </a:rPr>
-              <a:t>!</a:t>
-            </a:r>
-            <a:endParaRPr lang="de-DE" b="1" dirty="0" smtClean="0">
-              <a:solidFill>
-                <a:srgbClr val="008000"/>
-              </a:solidFill>
-            </a:endParaRPr>
           </a:p>
         </p:txBody>
       </p:sp>
@@ -11684,7 +11326,7 @@
     </p:spTree>
     <p:extLst>
       <p:ext uri="{BB962C8B-B14F-4D97-AF65-F5344CB8AC3E}">
-        <p14:creationId xmlns:p14="http://schemas.microsoft.com/office/powerpoint/2010/main" val="976292356"/>
+        <p14:creationId xmlns:p14="http://schemas.microsoft.com/office/powerpoint/2010/main" val="51044277"/>
       </p:ext>
     </p:extLst>
   </p:cSld>
@@ -11730,6 +11372,518 @@
         </p:nvSpPr>
         <p:spPr/>
         <p:txBody>
+          <a:bodyPr>
+            <a:normAutofit/>
+          </a:bodyPr>
+          <a:lstStyle/>
+          <a:p>
+            <a:r>
+              <a:rPr lang="de-DE" dirty="0" err="1" smtClean="0"/>
+              <a:t>How</a:t>
+            </a:r>
+            <a:r>
+              <a:rPr lang="de-DE" dirty="0" smtClean="0"/>
+              <a:t> </a:t>
+            </a:r>
+            <a:r>
+              <a:rPr lang="de-DE" dirty="0" err="1" smtClean="0"/>
+              <a:t>to</a:t>
+            </a:r>
+            <a:r>
+              <a:rPr lang="de-DE" dirty="0" smtClean="0"/>
+              <a:t> </a:t>
+            </a:r>
+            <a:r>
+              <a:rPr lang="de-DE" dirty="0" err="1" smtClean="0"/>
+              <a:t>participate</a:t>
+            </a:r>
+            <a:endParaRPr lang="de-DE" dirty="0"/>
+          </a:p>
+        </p:txBody>
+      </p:sp>
+      <p:sp>
+        <p:nvSpPr>
+          <p:cNvPr id="3" name="Inhaltsplatzhalter 2"/>
+          <p:cNvSpPr>
+            <a:spLocks noGrp="1"/>
+          </p:cNvSpPr>
+          <p:nvPr>
+            <p:ph idx="1"/>
+          </p:nvPr>
+        </p:nvSpPr>
+        <p:spPr/>
+        <p:txBody>
+          <a:bodyPr>
+            <a:normAutofit fontScale="85000" lnSpcReduction="20000"/>
+          </a:bodyPr>
+          <a:lstStyle/>
+          <a:p>
+            <a:pPr marL="514350" indent="-514350">
+              <a:buFont typeface="+mj-lt"/>
+              <a:buAutoNum type="arabicPeriod"/>
+            </a:pPr>
+            <a:r>
+              <a:rPr lang="de-DE" dirty="0" err="1" smtClean="0"/>
+              <a:t>We</a:t>
+            </a:r>
+            <a:r>
+              <a:rPr lang="de-DE" dirty="0" smtClean="0"/>
+              <a:t> </a:t>
+            </a:r>
+            <a:r>
+              <a:rPr lang="de-DE" dirty="0" err="1" smtClean="0"/>
+              <a:t>need</a:t>
+            </a:r>
+            <a:r>
+              <a:rPr lang="de-DE" dirty="0" smtClean="0"/>
+              <a:t>: </a:t>
+            </a:r>
+            <a:r>
+              <a:rPr lang="de-DE" dirty="0" err="1" smtClean="0"/>
+              <a:t>cryptologists</a:t>
+            </a:r>
+            <a:r>
+              <a:rPr lang="de-DE" dirty="0" smtClean="0"/>
+              <a:t>, sysadmins, </a:t>
+            </a:r>
+            <a:r>
+              <a:rPr lang="de-DE" dirty="0" err="1" smtClean="0"/>
+              <a:t>hackers</a:t>
+            </a:r>
+            <a:endParaRPr lang="de-DE" dirty="0" smtClean="0"/>
+          </a:p>
+          <a:p>
+            <a:pPr marL="514350" indent="-514350">
+              <a:buFont typeface="+mj-lt"/>
+              <a:buAutoNum type="arabicPeriod"/>
+            </a:pPr>
+            <a:r>
+              <a:rPr lang="de-DE" dirty="0" smtClean="0"/>
+              <a:t>Read </a:t>
+            </a:r>
+            <a:r>
+              <a:rPr lang="de-DE" dirty="0" err="1" smtClean="0"/>
+              <a:t>the</a:t>
+            </a:r>
+            <a:r>
+              <a:rPr lang="de-DE" dirty="0" smtClean="0"/>
+              <a:t> </a:t>
+            </a:r>
+            <a:r>
+              <a:rPr lang="de-DE" dirty="0" err="1" smtClean="0"/>
+              <a:t>document</a:t>
+            </a:r>
+            <a:r>
+              <a:rPr lang="de-DE" dirty="0" smtClean="0"/>
+              <a:t>, find </a:t>
+            </a:r>
+            <a:r>
+              <a:rPr lang="de-DE" dirty="0" err="1" smtClean="0"/>
+              <a:t>bugs</a:t>
+            </a:r>
+            <a:endParaRPr lang="de-DE" dirty="0" smtClean="0"/>
+          </a:p>
+          <a:p>
+            <a:pPr marL="514350" indent="-514350">
+              <a:buFont typeface="+mj-lt"/>
+              <a:buAutoNum type="arabicPeriod"/>
+            </a:pPr>
+            <a:r>
+              <a:rPr lang="de-DE" dirty="0" err="1" smtClean="0"/>
+              <a:t>Subscribe</a:t>
+            </a:r>
+            <a:r>
+              <a:rPr lang="de-DE" dirty="0" smtClean="0"/>
+              <a:t> </a:t>
+            </a:r>
+            <a:r>
+              <a:rPr lang="de-DE" dirty="0" err="1" smtClean="0"/>
+              <a:t>to</a:t>
+            </a:r>
+            <a:r>
+              <a:rPr lang="de-DE" dirty="0" smtClean="0"/>
+              <a:t> </a:t>
+            </a:r>
+            <a:r>
+              <a:rPr lang="de-DE" dirty="0" err="1" smtClean="0"/>
+              <a:t>the</a:t>
+            </a:r>
+            <a:r>
+              <a:rPr lang="de-DE" dirty="0" smtClean="0"/>
+              <a:t> </a:t>
+            </a:r>
+            <a:r>
+              <a:rPr lang="de-DE" dirty="0" err="1" smtClean="0"/>
+              <a:t>mailing</a:t>
+            </a:r>
+            <a:r>
+              <a:rPr lang="de-DE" dirty="0" smtClean="0"/>
+              <a:t> </a:t>
+            </a:r>
+            <a:r>
+              <a:rPr lang="de-DE" dirty="0" err="1" smtClean="0"/>
+              <a:t>list</a:t>
+            </a:r>
+            <a:endParaRPr lang="de-DE" dirty="0" smtClean="0"/>
+          </a:p>
+          <a:p>
+            <a:pPr marL="514350" indent="-514350">
+              <a:buFont typeface="+mj-lt"/>
+              <a:buAutoNum type="arabicPeriod"/>
+            </a:pPr>
+            <a:r>
+              <a:rPr lang="de-DE" dirty="0" err="1" smtClean="0"/>
+              <a:t>Understand</a:t>
+            </a:r>
+            <a:r>
+              <a:rPr lang="de-DE" dirty="0" smtClean="0"/>
+              <a:t> </a:t>
+            </a:r>
+            <a:r>
+              <a:rPr lang="de-DE" dirty="0" err="1" smtClean="0"/>
+              <a:t>the</a:t>
+            </a:r>
+            <a:r>
+              <a:rPr lang="de-DE" dirty="0" smtClean="0"/>
+              <a:t> </a:t>
+            </a:r>
+            <a:r>
+              <a:rPr lang="de-DE" dirty="0" err="1" smtClean="0"/>
+              <a:t>cipher</a:t>
+            </a:r>
+            <a:r>
+              <a:rPr lang="de-DE" dirty="0" smtClean="0"/>
+              <a:t> </a:t>
+            </a:r>
+            <a:r>
+              <a:rPr lang="de-DE" dirty="0" err="1" smtClean="0"/>
+              <a:t>strings</a:t>
+            </a:r>
+            <a:r>
+              <a:rPr lang="de-DE" dirty="0" smtClean="0"/>
+              <a:t> Variant (A) </a:t>
+            </a:r>
+            <a:r>
+              <a:rPr lang="de-DE" dirty="0" err="1" smtClean="0"/>
+              <a:t>and</a:t>
+            </a:r>
+            <a:r>
+              <a:rPr lang="de-DE" dirty="0" smtClean="0"/>
+              <a:t> (B) </a:t>
+            </a:r>
+            <a:r>
+              <a:rPr lang="de-DE" dirty="0" err="1" smtClean="0"/>
+              <a:t>before</a:t>
+            </a:r>
+            <a:r>
+              <a:rPr lang="de-DE" dirty="0" smtClean="0"/>
+              <a:t> </a:t>
+            </a:r>
+            <a:r>
+              <a:rPr lang="de-DE" dirty="0" err="1" smtClean="0"/>
+              <a:t>proposing</a:t>
+            </a:r>
+            <a:r>
+              <a:rPr lang="de-DE" dirty="0" smtClean="0"/>
+              <a:t> </a:t>
+            </a:r>
+            <a:r>
+              <a:rPr lang="de-DE" dirty="0" err="1" smtClean="0"/>
+              <a:t>some</a:t>
+            </a:r>
+            <a:r>
+              <a:rPr lang="de-DE" dirty="0" smtClean="0"/>
+              <a:t> </a:t>
+            </a:r>
+            <a:r>
+              <a:rPr lang="de-DE" dirty="0" err="1" smtClean="0"/>
+              <a:t>changes</a:t>
+            </a:r>
+            <a:endParaRPr lang="de-DE" dirty="0" smtClean="0"/>
+          </a:p>
+          <a:p>
+            <a:pPr marL="514350" indent="-514350">
+              <a:buFont typeface="+mj-lt"/>
+              <a:buAutoNum type="arabicPeriod"/>
+            </a:pPr>
+            <a:r>
+              <a:rPr lang="de-DE" dirty="0" err="1" smtClean="0"/>
+              <a:t>If</a:t>
+            </a:r>
+            <a:r>
+              <a:rPr lang="de-DE" dirty="0" smtClean="0"/>
+              <a:t> </a:t>
+            </a:r>
+            <a:r>
+              <a:rPr lang="de-DE" dirty="0" err="1" smtClean="0"/>
+              <a:t>you</a:t>
+            </a:r>
+            <a:r>
+              <a:rPr lang="de-DE" dirty="0" smtClean="0"/>
+              <a:t> </a:t>
+            </a:r>
+            <a:r>
+              <a:rPr lang="de-DE" dirty="0" err="1" smtClean="0"/>
+              <a:t>propose</a:t>
+            </a:r>
+            <a:r>
+              <a:rPr lang="de-DE" dirty="0" smtClean="0"/>
+              <a:t> a </a:t>
+            </a:r>
+            <a:r>
+              <a:rPr lang="de-DE" dirty="0" err="1" smtClean="0"/>
+              <a:t>new</a:t>
+            </a:r>
+            <a:r>
+              <a:rPr lang="de-DE" dirty="0" smtClean="0"/>
+              <a:t> </a:t>
+            </a:r>
+            <a:r>
+              <a:rPr lang="de-DE" dirty="0" err="1" smtClean="0"/>
+              <a:t>subsection</a:t>
+            </a:r>
+            <a:r>
+              <a:rPr lang="de-DE" dirty="0" smtClean="0"/>
+              <a:t>, </a:t>
+            </a:r>
+            <a:r>
+              <a:rPr lang="de-DE" dirty="0" err="1" smtClean="0"/>
+              <a:t>make</a:t>
+            </a:r>
+            <a:r>
+              <a:rPr lang="de-DE" dirty="0" smtClean="0"/>
+              <a:t> a sample </a:t>
+            </a:r>
+            <a:r>
+              <a:rPr lang="de-DE" dirty="0" err="1" smtClean="0"/>
+              <a:t>config</a:t>
+            </a:r>
+            <a:r>
+              <a:rPr lang="de-DE" dirty="0" smtClean="0"/>
+              <a:t> </a:t>
+            </a:r>
+            <a:r>
+              <a:rPr lang="de-DE" dirty="0" err="1" smtClean="0"/>
+              <a:t>with</a:t>
+            </a:r>
+            <a:r>
+              <a:rPr lang="de-DE" dirty="0" smtClean="0"/>
+              <a:t> variant (B)</a:t>
+            </a:r>
+            <a:endParaRPr lang="de-DE" dirty="0" smtClean="0"/>
+          </a:p>
+          <a:p>
+            <a:pPr marL="514350" indent="-514350">
+              <a:buFont typeface="+mj-lt"/>
+              <a:buAutoNum type="arabicPeriod"/>
+            </a:pPr>
+            <a:r>
+              <a:rPr lang="de-DE" dirty="0" err="1" smtClean="0"/>
+              <a:t>Git</a:t>
+            </a:r>
+            <a:r>
+              <a:rPr lang="de-DE" dirty="0" smtClean="0"/>
+              <a:t> </a:t>
+            </a:r>
+            <a:r>
+              <a:rPr lang="de-DE" dirty="0" err="1" smtClean="0"/>
+              <a:t>repo</a:t>
+            </a:r>
+            <a:r>
+              <a:rPr lang="de-DE" dirty="0" smtClean="0"/>
+              <a:t> </a:t>
+            </a:r>
+            <a:r>
+              <a:rPr lang="de-DE" dirty="0" err="1" smtClean="0"/>
+              <a:t>is</a:t>
+            </a:r>
+            <a:r>
+              <a:rPr lang="de-DE" dirty="0" smtClean="0"/>
+              <a:t> </a:t>
+            </a:r>
+            <a:r>
+              <a:rPr lang="de-DE" dirty="0" err="1" smtClean="0"/>
+              <a:t>world</a:t>
+            </a:r>
+            <a:r>
+              <a:rPr lang="de-DE" dirty="0" err="1" smtClean="0"/>
+              <a:t>-</a:t>
+            </a:r>
+            <a:r>
+              <a:rPr lang="de-DE" dirty="0" err="1" smtClean="0"/>
+              <a:t>readable</a:t>
+            </a:r>
+            <a:endParaRPr lang="de-DE" dirty="0" smtClean="0"/>
+          </a:p>
+          <a:p>
+            <a:pPr marL="514350" indent="-514350">
+              <a:buFont typeface="+mj-lt"/>
+              <a:buAutoNum type="arabicPeriod"/>
+            </a:pPr>
+            <a:r>
+              <a:rPr lang="de-DE" dirty="0" err="1" smtClean="0"/>
+              <a:t>We</a:t>
+            </a:r>
+            <a:r>
+              <a:rPr lang="de-DE" dirty="0" smtClean="0"/>
+              <a:t> </a:t>
+            </a:r>
+            <a:r>
+              <a:rPr lang="de-DE" dirty="0" err="1" smtClean="0"/>
+              <a:t>need</a:t>
+            </a:r>
+            <a:r>
+              <a:rPr lang="de-DE" dirty="0" smtClean="0"/>
+              <a:t>: </a:t>
+            </a:r>
+          </a:p>
+          <a:p>
+            <a:pPr marL="914400" lvl="1" indent="-514350">
+              <a:buFont typeface="+mj-lt"/>
+              <a:buAutoNum type="arabicPeriod"/>
+            </a:pPr>
+            <a:r>
+              <a:rPr lang="de-DE" dirty="0" smtClean="0"/>
+              <a:t>Add a </a:t>
+            </a:r>
+            <a:r>
+              <a:rPr lang="de-DE" dirty="0" err="1" smtClean="0"/>
+              <a:t>subsection</a:t>
+            </a:r>
+            <a:r>
+              <a:rPr lang="de-DE" dirty="0" smtClean="0"/>
+              <a:t> </a:t>
+            </a:r>
+            <a:r>
+              <a:rPr lang="de-DE" dirty="0" err="1" smtClean="0"/>
+              <a:t>from</a:t>
+            </a:r>
+            <a:r>
+              <a:rPr lang="de-DE" dirty="0" smtClean="0"/>
+              <a:t> </a:t>
+            </a:r>
+            <a:r>
+              <a:rPr lang="de-DE" dirty="0" err="1" smtClean="0"/>
+              <a:t>the</a:t>
+            </a:r>
+            <a:r>
+              <a:rPr lang="de-DE" dirty="0" smtClean="0"/>
+              <a:t> TODO </a:t>
+            </a:r>
+            <a:r>
+              <a:rPr lang="de-DE" dirty="0" err="1" smtClean="0"/>
+              <a:t>list</a:t>
+            </a:r>
+            <a:endParaRPr lang="de-DE" dirty="0" smtClean="0"/>
+          </a:p>
+          <a:p>
+            <a:pPr marL="914400" lvl="1" indent="-514350">
+              <a:buFont typeface="+mj-lt"/>
+              <a:buAutoNum type="arabicPeriod"/>
+            </a:pPr>
+            <a:r>
+              <a:rPr lang="de-DE" b="1" dirty="0" err="1" smtClean="0">
+                <a:solidFill>
+                  <a:srgbClr val="008000"/>
+                </a:solidFill>
+              </a:rPr>
+              <a:t>Reviewers</a:t>
+            </a:r>
+            <a:r>
+              <a:rPr lang="de-DE" b="1" dirty="0" smtClean="0">
+                <a:solidFill>
+                  <a:srgbClr val="008000"/>
+                </a:solidFill>
+              </a:rPr>
+              <a:t>!</a:t>
+            </a:r>
+            <a:endParaRPr lang="de-DE" b="1" dirty="0" smtClean="0">
+              <a:solidFill>
+                <a:srgbClr val="008000"/>
+              </a:solidFill>
+            </a:endParaRPr>
+          </a:p>
+        </p:txBody>
+      </p:sp>
+      <p:sp>
+        <p:nvSpPr>
+          <p:cNvPr id="4" name="Textfeld 3"/>
+          <p:cNvSpPr txBox="1"/>
+          <p:nvPr/>
+        </p:nvSpPr>
+        <p:spPr>
+          <a:xfrm>
+            <a:off x="7297503" y="6126163"/>
+            <a:ext cx="1389297" cy="369332"/>
+          </a:xfrm>
+          <a:prstGeom prst="rect">
+            <a:avLst/>
+          </a:prstGeom>
+          <a:noFill/>
+        </p:spPr>
+        <p:txBody>
+          <a:bodyPr wrap="square" rtlCol="0">
+            <a:spAutoFit/>
+          </a:bodyPr>
+          <a:lstStyle/>
+          <a:p>
+            <a:r>
+              <a:rPr lang="de-DE" dirty="0" smtClean="0"/>
+              <a:t>Aaron</a:t>
+            </a:r>
+            <a:endParaRPr lang="de-DE" dirty="0"/>
+          </a:p>
+        </p:txBody>
+      </p:sp>
+    </p:spTree>
+    <p:extLst>
+      <p:ext uri="{BB962C8B-B14F-4D97-AF65-F5344CB8AC3E}">
+        <p14:creationId xmlns:p14="http://schemas.microsoft.com/office/powerpoint/2010/main" val="976292356"/>
+      </p:ext>
+    </p:extLst>
+  </p:cSld>
+  <p:clrMapOvr>
+    <a:masterClrMapping/>
+  </p:clrMapOvr>
+  <p:timing>
+    <p:tnLst>
+      <p:par>
+        <p:cTn xmlns:p14="http://schemas.microsoft.com/office/powerpoint/2010/main" id="1" dur="indefinite" restart="never" nodeType="tmRoot"/>
+      </p:par>
+    </p:tnLst>
+  </p:timing>
+</p:sld>
+</file>
+
+<file path=ppt/slides/slide42.xml><?xml version="1.0" encoding="utf-8"?>
+<p:sld xmlns:a="http://schemas.openxmlformats.org/drawingml/2006/main" xmlns:r="http://schemas.openxmlformats.org/officeDocument/2006/relationships" xmlns:p="http://schemas.openxmlformats.org/presentationml/2006/main">
+  <p:cSld>
+    <p:spTree>
+      <p:nvGrpSpPr>
+        <p:cNvPr id="1" name=""/>
+        <p:cNvGrpSpPr/>
+        <p:nvPr/>
+      </p:nvGrpSpPr>
+      <p:grpSpPr>
+        <a:xfrm>
+          <a:off x="0" y="0"/>
+          <a:ext cx="0" cy="0"/>
+          <a:chOff x="0" y="0"/>
+          <a:chExt cx="0" cy="0"/>
+        </a:xfrm>
+      </p:grpSpPr>
+      <p:sp>
+        <p:nvSpPr>
+          <p:cNvPr id="2" name="Titel 1"/>
+          <p:cNvSpPr>
+            <a:spLocks noGrp="1"/>
+          </p:cNvSpPr>
+          <p:nvPr>
+            <p:ph type="title"/>
+          </p:nvPr>
+        </p:nvSpPr>
+        <p:spPr/>
+        <p:txBody>
           <a:bodyPr/>
           <a:lstStyle/>
           <a:p>
@@ -11884,7 +12038,7 @@
 </p:sld>
 </file>
 
-<file path=ppt/slides/slide42.xml><?xml version="1.0" encoding="utf-8"?>
+<file path=ppt/slides/slide43.xml><?xml version="1.0" encoding="utf-8"?>
 <p:sld xmlns:a="http://schemas.openxmlformats.org/drawingml/2006/main" xmlns:r="http://schemas.openxmlformats.org/officeDocument/2006/relationships" xmlns:p="http://schemas.openxmlformats.org/presentationml/2006/main">
   <p:cSld>
     <p:spTree>

</xml_diff>

<commit_message>
minor rephrasing of the slides
</commit_message>
<xml_diff>
--- a/presentations/20131122-Deepsec-ACH project.pptx
+++ b/presentations/20131122-Deepsec-ACH project.pptx
@@ -5675,6 +5675,13 @@
   <p:clrMapOvr>
     <a:masterClrMapping/>
   </p:clrMapOvr>
+  <p:timing>
+    <p:tnLst>
+      <p:par>
+        <p:cTn xmlns:p14="http://schemas.microsoft.com/office/powerpoint/2010/main" id="1" dur="indefinite" restart="never" nodeType="tmRoot"/>
+      </p:par>
+    </p:tnLst>
+  </p:timing>
 </p:sld>
 </file>
 
@@ -5777,6 +5784,13 @@
   <p:clrMapOvr>
     <a:masterClrMapping/>
   </p:clrMapOvr>
+  <p:timing>
+    <p:tnLst>
+      <p:par>
+        <p:cTn xmlns:p14="http://schemas.microsoft.com/office/powerpoint/2010/main" id="1" dur="indefinite" restart="never" nodeType="tmRoot"/>
+      </p:par>
+    </p:tnLst>
+  </p:timing>
 </p:sld>
 </file>
 
@@ -6107,6 +6121,13 @@
   <p:clrMapOvr>
     <a:masterClrMapping/>
   </p:clrMapOvr>
+  <p:timing>
+    <p:tnLst>
+      <p:par>
+        <p:cTn xmlns:p14="http://schemas.microsoft.com/office/powerpoint/2010/main" id="1" dur="indefinite" restart="never" nodeType="tmRoot"/>
+      </p:par>
+    </p:tnLst>
+  </p:timing>
 </p:sld>
 </file>
 
@@ -6328,6 +6349,13 @@
   <p:clrMapOvr>
     <a:masterClrMapping/>
   </p:clrMapOvr>
+  <p:timing>
+    <p:tnLst>
+      <p:par>
+        <p:cTn xmlns:p14="http://schemas.microsoft.com/office/powerpoint/2010/main" id="1" dur="indefinite" restart="never" nodeType="tmRoot"/>
+      </p:par>
+    </p:tnLst>
+  </p:timing>
 </p:sld>
 </file>
 
@@ -6517,6 +6545,13 @@
   <p:clrMapOvr>
     <a:masterClrMapping/>
   </p:clrMapOvr>
+  <p:timing>
+    <p:tnLst>
+      <p:par>
+        <p:cTn xmlns:p14="http://schemas.microsoft.com/office/powerpoint/2010/main" id="1" dur="indefinite" restart="never" nodeType="tmRoot"/>
+      </p:par>
+    </p:tnLst>
+  </p:timing>
 </p:sld>
 </file>
 
@@ -7128,6 +7163,13 @@
   <p:clrMapOvr>
     <a:masterClrMapping/>
   </p:clrMapOvr>
+  <p:timing>
+    <p:tnLst>
+      <p:par>
+        <p:cTn xmlns:p14="http://schemas.microsoft.com/office/powerpoint/2010/main" id="1" dur="indefinite" restart="never" nodeType="tmRoot"/>
+      </p:par>
+    </p:tnLst>
+  </p:timing>
 </p:sld>
 </file>
 
@@ -8180,7 +8222,31 @@
             </a:r>
             <a:r>
               <a:rPr lang="de-DE" dirty="0" smtClean="0"/>
-              <a:t> server?</a:t>
+              <a:t> server </a:t>
+            </a:r>
+            <a:r>
+              <a:rPr lang="de-DE" dirty="0" err="1" smtClean="0"/>
+              <a:t>for</a:t>
+            </a:r>
+            <a:r>
+              <a:rPr lang="de-DE" dirty="0" smtClean="0"/>
+              <a:t> a </a:t>
+            </a:r>
+            <a:r>
+              <a:rPr lang="de-DE" dirty="0" err="1" smtClean="0"/>
+              <a:t>newer</a:t>
+            </a:r>
+            <a:r>
+              <a:rPr lang="de-DE" dirty="0" smtClean="0"/>
+              <a:t> </a:t>
+            </a:r>
+            <a:r>
+              <a:rPr lang="de-DE" dirty="0" err="1" smtClean="0"/>
+              <a:t>version</a:t>
+            </a:r>
+            <a:r>
+              <a:rPr lang="de-DE" dirty="0" smtClean="0"/>
+              <a:t>?</a:t>
             </a:r>
           </a:p>
           <a:p>
@@ -11034,6 +11100,13 @@
   <p:clrMapOvr>
     <a:masterClrMapping/>
   </p:clrMapOvr>
+  <p:timing>
+    <p:tnLst>
+      <p:par>
+        <p:cTn xmlns:p14="http://schemas.microsoft.com/office/powerpoint/2010/main" id="1" dur="indefinite" restart="never" nodeType="tmRoot"/>
+      </p:par>
+    </p:tnLst>
+  </p:timing>
 </p:sld>
 </file>
 
@@ -11144,6 +11217,41 @@
               <a:rPr lang="de-DE" dirty="0" smtClean="0"/>
               <a:t> (B)</a:t>
             </a:r>
+          </a:p>
+          <a:p>
+            <a:pPr>
+              <a:buFont typeface="Wingdings" charset="2"/>
+              <a:buChar char="ü"/>
+            </a:pPr>
+            <a:r>
+              <a:rPr lang="de-DE" dirty="0" err="1" smtClean="0"/>
+              <a:t>ToC</a:t>
+            </a:r>
+            <a:r>
+              <a:rPr lang="de-DE" dirty="0" smtClean="0"/>
+              <a:t> </a:t>
+            </a:r>
+            <a:r>
+              <a:rPr lang="de-DE" dirty="0" err="1" smtClean="0"/>
+              <a:t>is</a:t>
+            </a:r>
+            <a:r>
+              <a:rPr lang="de-DE" dirty="0" smtClean="0"/>
+              <a:t> in </a:t>
+            </a:r>
+            <a:r>
+              <a:rPr lang="de-DE" dirty="0" err="1" smtClean="0"/>
+              <a:t>freeze</a:t>
+            </a:r>
+            <a:r>
+              <a:rPr lang="de-DE" dirty="0" smtClean="0"/>
+              <a:t> </a:t>
+            </a:r>
+            <a:r>
+              <a:rPr lang="de-DE" dirty="0" err="1" smtClean="0"/>
+              <a:t>state</a:t>
+            </a:r>
+            <a:endParaRPr lang="de-DE" dirty="0" smtClean="0"/>
           </a:p>
           <a:p>
             <a:r>
@@ -11624,19 +11732,27 @@
             </a:r>
             <a:r>
               <a:rPr lang="de-DE" dirty="0" err="1" smtClean="0"/>
-              <a:t>propose</a:t>
+              <a:t>add</a:t>
+            </a:r>
+            <a:r>
+              <a:rPr lang="de-DE" dirty="0" smtClean="0"/>
+              <a:t> </a:t>
+            </a:r>
+            <a:r>
+              <a:rPr lang="de-DE" dirty="0" err="1" smtClean="0"/>
+              <a:t>content</a:t>
+            </a:r>
+            <a:r>
+              <a:rPr lang="de-DE" dirty="0" smtClean="0"/>
+              <a:t> </a:t>
+            </a:r>
+            <a:r>
+              <a:rPr lang="de-DE" dirty="0" err="1" smtClean="0"/>
+              <a:t>to</a:t>
             </a:r>
             <a:r>
               <a:rPr lang="de-DE" dirty="0" smtClean="0"/>
               <a:t> a </a:t>
-            </a:r>
-            <a:r>
-              <a:rPr lang="de-DE" dirty="0" err="1" smtClean="0"/>
-              <a:t>new</a:t>
-            </a:r>
-            <a:r>
-              <a:rPr lang="de-DE" dirty="0" smtClean="0"/>
-              <a:t> </a:t>
             </a:r>
             <a:r>
               <a:rPr lang="de-DE" dirty="0" err="1" smtClean="0"/>
@@ -12271,6 +12387,13 @@
   <p:clrMapOvr>
     <a:masterClrMapping/>
   </p:clrMapOvr>
+  <p:timing>
+    <p:tnLst>
+      <p:par>
+        <p:cTn xmlns:p14="http://schemas.microsoft.com/office/powerpoint/2010/main" id="1" dur="indefinite" restart="never" nodeType="tmRoot"/>
+      </p:par>
+    </p:tnLst>
+  </p:timing>
 </p:sld>
 </file>
 
@@ -13079,36 +13202,6 @@
               </a:rPr>
               <a:t>!</a:t>
             </a:r>
-          </a:p>
-        </p:txBody>
-      </p:sp>
-      <p:sp>
-        <p:nvSpPr>
-          <p:cNvPr id="4" name="Textfeld 3"/>
-          <p:cNvSpPr txBox="1"/>
-          <p:nvPr/>
-        </p:nvSpPr>
-        <p:spPr>
-          <a:xfrm>
-            <a:off x="6713249" y="682999"/>
-            <a:ext cx="1291420" cy="369332"/>
-          </a:xfrm>
-          <a:prstGeom prst="rect">
-            <a:avLst/>
-          </a:prstGeom>
-          <a:noFill/>
-        </p:spPr>
-        <p:txBody>
-          <a:bodyPr wrap="square" rtlCol="0">
-            <a:spAutoFit/>
-          </a:bodyPr>
-          <a:lstStyle/>
-          <a:p>
-            <a:r>
-              <a:rPr lang="de-DE" dirty="0" smtClean="0"/>
-              <a:t>(Aaron)</a:t>
-            </a:r>
-            <a:endParaRPr lang="de-DE" dirty="0"/>
           </a:p>
         </p:txBody>
       </p:sp>
@@ -13472,6 +13565,13 @@
   <p:clrMapOvr>
     <a:masterClrMapping/>
   </p:clrMapOvr>
+  <p:timing>
+    <p:tnLst>
+      <p:par>
+        <p:cTn xmlns:p14="http://schemas.microsoft.com/office/powerpoint/2010/main" id="1" dur="indefinite" restart="never" nodeType="tmRoot"/>
+      </p:par>
+    </p:tnLst>
+  </p:timing>
 </p:sld>
 </file>
 
@@ -13784,6 +13884,13 @@
   <p:clrMapOvr>
     <a:masterClrMapping/>
   </p:clrMapOvr>
+  <p:timing>
+    <p:tnLst>
+      <p:par>
+        <p:cTn xmlns:p14="http://schemas.microsoft.com/office/powerpoint/2010/main" id="1" dur="indefinite" restart="never" nodeType="tmRoot"/>
+      </p:par>
+    </p:tnLst>
+  </p:timing>
 </p:sld>
 </file>
 
@@ -13968,6 +14075,13 @@
   <p:clrMapOvr>
     <a:masterClrMapping/>
   </p:clrMapOvr>
+  <p:timing>
+    <p:tnLst>
+      <p:par>
+        <p:cTn xmlns:p14="http://schemas.microsoft.com/office/powerpoint/2010/main" id="1" dur="indefinite" restart="never" nodeType="tmRoot"/>
+      </p:par>
+    </p:tnLst>
+  </p:timing>
 </p:sld>
 </file>
 
@@ -14052,6 +14166,13 @@
   <p:clrMapOvr>
     <a:masterClrMapping/>
   </p:clrMapOvr>
+  <p:timing>
+    <p:tnLst>
+      <p:par>
+        <p:cTn xmlns:p14="http://schemas.microsoft.com/office/powerpoint/2010/main" id="1" dur="indefinite" restart="never" nodeType="tmRoot"/>
+      </p:par>
+    </p:tnLst>
+  </p:timing>
 </p:sld>
 </file>
 

</xml_diff>